<commit_message>
FEAT : 8강 PPT 완료 / 9강 미완료
</commit_message>
<xml_diff>
--- a/리눅스(v2023)/리눅스_8강_v2023.pptx
+++ b/리눅스(v2023)/리눅스_8강_v2023.pptx
@@ -3312,7 +3312,7 @@
                 </a:spcAft>
                 <a:buClrTx/>
               </a:pPr>
-              <a:t>4/3/2022</a:t>
+              <a:t>4/3/2023</a:t>
             </a:fld>
             <a:endParaRPr lang="en-US" sz="1770" b="0">
               <a:solidFill>
@@ -3568,7 +3568,7 @@
                 </a:spcAft>
                 <a:buClrTx/>
               </a:pPr>
-              <a:t>4/3/2022</a:t>
+              <a:t>4/3/2023</a:t>
             </a:fld>
             <a:endParaRPr lang="en-US" sz="1770" b="0">
               <a:solidFill>
@@ -3867,7 +3867,7 @@
                 </a:spcAft>
                 <a:buClrTx/>
               </a:pPr>
-              <a:t>4/3/2022</a:t>
+              <a:t>4/3/2023</a:t>
             </a:fld>
             <a:endParaRPr lang="en-US" sz="1770" b="0">
               <a:solidFill>
@@ -4100,7 +4100,7 @@
                 </a:spcAft>
                 <a:buClrTx/>
               </a:pPr>
-              <a:t>4/3/2022</a:t>
+              <a:t>4/3/2023</a:t>
             </a:fld>
             <a:endParaRPr lang="en-US" sz="1770" b="0">
               <a:solidFill>
@@ -4310,7 +4310,7 @@
                 </a:spcAft>
                 <a:buClrTx/>
               </a:pPr>
-              <a:t>4/3/2022</a:t>
+              <a:t>4/3/2023</a:t>
             </a:fld>
             <a:endParaRPr lang="en-US" sz="1770" b="0">
               <a:solidFill>
@@ -6199,7 +6199,7 @@
           <p:cNvPr id="10" name="TextBox 9">
             <a:extLst>
               <a:ext uri="{FF2B5EF4-FFF2-40B4-BE49-F238E27FC236}">
-                <a16:creationId xmlns:a16="http://schemas.microsoft.com/office/drawing/2014/main" id="{FAF3C492-320D-47AB-85D0-A052F1E4C0C1}"/>
+                <a16:creationId xmlns:a16="http://schemas.microsoft.com/office/drawing/2014/main" xmlns="" id="{FAF3C492-320D-47AB-85D0-A052F1E4C0C1}"/>
               </a:ext>
             </a:extLst>
           </p:cNvPr>
@@ -6235,7 +6235,7 @@
           <p:cNvPr id="11" name="그림 10">
             <a:extLst>
               <a:ext uri="{FF2B5EF4-FFF2-40B4-BE49-F238E27FC236}">
-                <a16:creationId xmlns:a16="http://schemas.microsoft.com/office/drawing/2014/main" id="{B09072A7-A065-454B-A03B-4D64F92C7BC1}"/>
+                <a16:creationId xmlns:a16="http://schemas.microsoft.com/office/drawing/2014/main" xmlns="" id="{B09072A7-A065-454B-A03B-4D64F92C7BC1}"/>
               </a:ext>
             </a:extLst>
           </p:cNvPr>
@@ -7538,7 +7538,7 @@
           <p:cNvPr id="5" name="그림 4">
             <a:extLst>
               <a:ext uri="{FF2B5EF4-FFF2-40B4-BE49-F238E27FC236}">
-                <a16:creationId xmlns:a16="http://schemas.microsoft.com/office/drawing/2014/main" id="{D8F5D522-2CEB-4411-B7DC-640DBD2DC145}"/>
+                <a16:creationId xmlns:a16="http://schemas.microsoft.com/office/drawing/2014/main" xmlns="" id="{D8F5D522-2CEB-4411-B7DC-640DBD2DC145}"/>
               </a:ext>
             </a:extLst>
           </p:cNvPr>
@@ -8347,7 +8347,7 @@
                 </a:spcAft>
                 <a:buClrTx/>
               </a:pPr>
-              <a:t>4/3/2022</a:t>
+              <a:t>4/3/2023</a:t>
             </a:fld>
             <a:endParaRPr lang="en-US" sz="1770" b="0">
               <a:solidFill>
@@ -8654,7 +8654,7 @@
           <p:cNvPr id="6" name="Text Box 89">
             <a:extLst>
               <a:ext uri="{FF2B5EF4-FFF2-40B4-BE49-F238E27FC236}">
-                <a16:creationId xmlns:a16="http://schemas.microsoft.com/office/drawing/2014/main" id="{572AD506-CA01-4839-9A83-7123D80FF927}"/>
+                <a16:creationId xmlns:a16="http://schemas.microsoft.com/office/drawing/2014/main" xmlns="" id="{572AD506-CA01-4839-9A83-7123D80FF927}"/>
               </a:ext>
             </a:extLst>
           </p:cNvPr>
@@ -8904,7 +8904,7 @@
           <p:cNvPr id="5" name="TextBox 4">
             <a:extLst>
               <a:ext uri="{FF2B5EF4-FFF2-40B4-BE49-F238E27FC236}">
-                <a16:creationId xmlns:a16="http://schemas.microsoft.com/office/drawing/2014/main" id="{6622EF5E-A5C2-4034-869D-BDB6B9C77640}"/>
+                <a16:creationId xmlns:a16="http://schemas.microsoft.com/office/drawing/2014/main" xmlns="" id="{6622EF5E-A5C2-4034-869D-BDB6B9C77640}"/>
               </a:ext>
             </a:extLst>
           </p:cNvPr>
@@ -11700,21 +11700,21 @@
                 <a:gridCol w="3246106">
                   <a:extLst>
                     <a:ext uri="{9D8B030D-6E8A-4147-A177-3AD203B41FA5}">
-                      <a16:colId xmlns:a16="http://schemas.microsoft.com/office/drawing/2014/main" val="20000"/>
+                      <a16:colId xmlns:a16="http://schemas.microsoft.com/office/drawing/2014/main" xmlns="" val="20000"/>
                     </a:ext>
                   </a:extLst>
                 </a:gridCol>
                 <a:gridCol w="2617763">
                   <a:extLst>
                     <a:ext uri="{9D8B030D-6E8A-4147-A177-3AD203B41FA5}">
-                      <a16:colId xmlns:a16="http://schemas.microsoft.com/office/drawing/2014/main" val="20001"/>
+                      <a16:colId xmlns:a16="http://schemas.microsoft.com/office/drawing/2014/main" xmlns="" val="20001"/>
                     </a:ext>
                   </a:extLst>
                 </a:gridCol>
                 <a:gridCol w="3081974">
                   <a:extLst>
                     <a:ext uri="{9D8B030D-6E8A-4147-A177-3AD203B41FA5}">
-                      <a16:colId xmlns:a16="http://schemas.microsoft.com/office/drawing/2014/main" val="20002"/>
+                      <a16:colId xmlns:a16="http://schemas.microsoft.com/office/drawing/2014/main" xmlns="" val="20002"/>
                     </a:ext>
                   </a:extLst>
                 </a:gridCol>
@@ -11935,7 +11935,7 @@
                 </a:tc>
                 <a:extLst>
                   <a:ext uri="{0D108BD9-81ED-4DB2-BD59-A6C34878D82A}">
-                    <a16:rowId xmlns:a16="http://schemas.microsoft.com/office/drawing/2014/main" val="10000"/>
+                    <a16:rowId xmlns:a16="http://schemas.microsoft.com/office/drawing/2014/main" xmlns="" val="10000"/>
                   </a:ext>
                 </a:extLst>
               </a:tr>
@@ -12402,7 +12402,7 @@
                 </a:tc>
                 <a:extLst>
                   <a:ext uri="{0D108BD9-81ED-4DB2-BD59-A6C34878D82A}">
-                    <a16:rowId xmlns:a16="http://schemas.microsoft.com/office/drawing/2014/main" val="10001"/>
+                    <a16:rowId xmlns:a16="http://schemas.microsoft.com/office/drawing/2014/main" xmlns="" val="10001"/>
                   </a:ext>
                 </a:extLst>
               </a:tr>
@@ -12880,7 +12880,7 @@
                 </a:tc>
                 <a:extLst>
                   <a:ext uri="{0D108BD9-81ED-4DB2-BD59-A6C34878D82A}">
-                    <a16:rowId xmlns:a16="http://schemas.microsoft.com/office/drawing/2014/main" val="10002"/>
+                    <a16:rowId xmlns:a16="http://schemas.microsoft.com/office/drawing/2014/main" xmlns="" val="10002"/>
                   </a:ext>
                 </a:extLst>
               </a:tr>

</xml_diff>